<commit_message>
update add add exls
</commit_message>
<xml_diff>
--- a/第三篇_IM系统开发的那些事.pptx
+++ b/第三篇_IM系统开发的那些事.pptx
@@ -12073,6 +12073,53 @@
               <a:t>系统开发的那些事</a:t>
             </a:r>
             <a:endParaRPr lang="zh-CN" altLang="en-US" baseline="0" smtClean="0"/>
+          </a:p>
+        </p:txBody>
+      </p:sp>
+      <p:sp>
+        <p:nvSpPr>
+          <p:cNvPr id="2" name="文本框 1"/>
+          <p:cNvSpPr txBox="1"/>
+          <p:nvPr/>
+        </p:nvSpPr>
+        <p:spPr>
+          <a:xfrm>
+            <a:off x="2590165" y="5352415"/>
+            <a:ext cx="1657350" cy="370840"/>
+          </a:xfrm>
+          <a:prstGeom prst="rect">
+            <a:avLst/>
+          </a:prstGeom>
+          <a:noFill/>
+        </p:spPr>
+        <p:txBody>
+          <a:bodyPr wrap="none" rtlCol="0">
+            <a:spAutoFit/>
+          </a:bodyPr>
+          <a:p>
+            <a:pPr>
+              <a:lnSpc>
+                <a:spcPct val="130000"/>
+              </a:lnSpc>
+            </a:pPr>
+            <a:r>
+              <a:rPr lang="zh-CN" altLang="zh-CN" sz="1400" dirty="0" smtClean="0">
+                <a:latin typeface="Arial" panose="020B0604020202020204" pitchFamily="34" charset="0"/>
+                <a:ea typeface="微软雅黑" panose="020B0503020204020204" charset="-122"/>
+              </a:rPr>
+              <a:t>长寿梦</a:t>
+            </a:r>
+            <a:r>
+              <a:rPr lang="en-US" altLang="zh-CN" sz="1400" dirty="0" smtClean="0">
+                <a:latin typeface="Arial" panose="020B0604020202020204" pitchFamily="34" charset="0"/>
+                <a:ea typeface="微软雅黑" panose="020B0503020204020204" charset="-122"/>
+              </a:rPr>
+              <a:t>:406878851</a:t>
+            </a:r>
+            <a:endParaRPr lang="en-US" altLang="zh-CN" sz="1400" dirty="0" smtClean="0">
+              <a:latin typeface="Arial" panose="020B0604020202020204" pitchFamily="34" charset="0"/>
+              <a:ea typeface="微软雅黑" panose="020B0503020204020204" charset="-122"/>
+            </a:endParaRPr>
           </a:p>
         </p:txBody>
       </p:sp>

</xml_diff>